<commit_message>
model modified by niimura
</commit_message>
<xml_diff>
--- a/models/モデルシートv3.pptx
+++ b/models/モデルシートv3.pptx
@@ -48832,70 +48832,6 @@
           </a:p>
         </p:txBody>
       </p:sp>
-      <p:pic>
-        <p:nvPicPr>
-          <p:cNvPr id="95" name="Picture 5"/>
-          <p:cNvPicPr>
-            <a:picLocks noChangeAspect="1" noChangeArrowheads="1"/>
-          </p:cNvPicPr>
-          <p:nvPr/>
-        </p:nvPicPr>
-        <p:blipFill>
-          <a:blip r:embed="rId6">
-            <a:extLst>
-              <a:ext uri="{28A0092B-C50C-407E-A947-70E740481C1C}">
-                <a14:useLocalDpi xmlns:a14="http://schemas.microsoft.com/office/drawing/2010/main" val="0"/>
-              </a:ext>
-            </a:extLst>
-          </a:blip>
-          <a:srcRect/>
-          <a:stretch>
-            <a:fillRect/>
-          </a:stretch>
-        </p:blipFill>
-        <p:spPr bwMode="auto">
-          <a:xfrm>
-            <a:off x="5063927" y="3114318"/>
-            <a:ext cx="2664296" cy="2594096"/>
-          </a:xfrm>
-          <a:prstGeom prst="rect">
-            <a:avLst/>
-          </a:prstGeom>
-          <a:noFill/>
-          <a:ln>
-            <a:noFill/>
-          </a:ln>
-          <a:effectLst/>
-          <a:extLst>
-            <a:ext uri="{909E8E84-426E-40DD-AFC4-6F175D3DCCD1}">
-              <a14:hiddenFill xmlns:a14="http://schemas.microsoft.com/office/drawing/2010/main">
-                <a:solidFill>
-                  <a:schemeClr val="accent1"/>
-                </a:solidFill>
-              </a14:hiddenFill>
-            </a:ext>
-            <a:ext uri="{91240B29-F687-4F45-9708-019B960494DF}">
-              <a14:hiddenLine xmlns:a14="http://schemas.microsoft.com/office/drawing/2010/main" w="9525">
-                <a:solidFill>
-                  <a:schemeClr val="tx1"/>
-                </a:solidFill>
-                <a:miter lim="800000"/>
-                <a:headEnd/>
-                <a:tailEnd/>
-              </a14:hiddenLine>
-            </a:ext>
-            <a:ext uri="{AF507438-7753-43E0-B8FC-AC1667EBCBE1}">
-              <a14:hiddenEffects xmlns:a14="http://schemas.microsoft.com/office/drawing/2010/main">
-                <a:effectLst>
-                  <a:outerShdw dist="35921" dir="2700000" algn="ctr" rotWithShape="0">
-                    <a:schemeClr val="bg2"/>
-                  </a:outerShdw>
-                </a:effectLst>
-              </a14:hiddenEffects>
-            </a:ext>
-          </a:extLst>
-        </p:spPr>
-      </p:pic>
       <p:sp>
         <p:nvSpPr>
           <p:cNvPr id="96" name="円/楕円 95"/>
@@ -49196,70 +49132,6 @@
           </a:p>
         </p:txBody>
       </p:sp>
-      <p:pic>
-        <p:nvPicPr>
-          <p:cNvPr id="103" name="Picture 6"/>
-          <p:cNvPicPr>
-            <a:picLocks noChangeAspect="1" noChangeArrowheads="1"/>
-          </p:cNvPicPr>
-          <p:nvPr/>
-        </p:nvPicPr>
-        <p:blipFill>
-          <a:blip r:embed="rId7">
-            <a:extLst>
-              <a:ext uri="{28A0092B-C50C-407E-A947-70E740481C1C}">
-                <a14:useLocalDpi xmlns:a14="http://schemas.microsoft.com/office/drawing/2010/main" val="0"/>
-              </a:ext>
-            </a:extLst>
-          </a:blip>
-          <a:srcRect/>
-          <a:stretch>
-            <a:fillRect/>
-          </a:stretch>
-        </p:blipFill>
-        <p:spPr bwMode="auto">
-          <a:xfrm>
-            <a:off x="4559871" y="7076919"/>
-            <a:ext cx="3307397" cy="2476209"/>
-          </a:xfrm>
-          <a:prstGeom prst="rect">
-            <a:avLst/>
-          </a:prstGeom>
-          <a:noFill/>
-          <a:ln>
-            <a:noFill/>
-          </a:ln>
-          <a:effectLst/>
-          <a:extLst>
-            <a:ext uri="{909E8E84-426E-40DD-AFC4-6F175D3DCCD1}">
-              <a14:hiddenFill xmlns:a14="http://schemas.microsoft.com/office/drawing/2010/main">
-                <a:solidFill>
-                  <a:schemeClr val="accent1"/>
-                </a:solidFill>
-              </a14:hiddenFill>
-            </a:ext>
-            <a:ext uri="{91240B29-F687-4F45-9708-019B960494DF}">
-              <a14:hiddenLine xmlns:a14="http://schemas.microsoft.com/office/drawing/2010/main" w="9525">
-                <a:solidFill>
-                  <a:schemeClr val="tx1"/>
-                </a:solidFill>
-                <a:miter lim="800000"/>
-                <a:headEnd/>
-                <a:tailEnd/>
-              </a14:hiddenLine>
-            </a:ext>
-            <a:ext uri="{AF507438-7753-43E0-B8FC-AC1667EBCBE1}">
-              <a14:hiddenEffects xmlns:a14="http://schemas.microsoft.com/office/drawing/2010/main">
-                <a:effectLst>
-                  <a:outerShdw dist="35921" dir="2700000" algn="ctr" rotWithShape="0">
-                    <a:schemeClr val="bg2"/>
-                  </a:outerShdw>
-                </a:effectLst>
-              </a14:hiddenEffects>
-            </a:ext>
-          </a:extLst>
-        </p:spPr>
-      </p:pic>
       <p:sp>
         <p:nvSpPr>
           <p:cNvPr id="104" name="円/楕円 103"/>
@@ -49310,70 +49182,6 @@
           </a:p>
         </p:txBody>
       </p:sp>
-      <p:pic>
-        <p:nvPicPr>
-          <p:cNvPr id="106" name="Picture 2"/>
-          <p:cNvPicPr>
-            <a:picLocks noChangeAspect="1" noChangeArrowheads="1"/>
-          </p:cNvPicPr>
-          <p:nvPr/>
-        </p:nvPicPr>
-        <p:blipFill>
-          <a:blip r:embed="rId8">
-            <a:extLst>
-              <a:ext uri="{28A0092B-C50C-407E-A947-70E740481C1C}">
-                <a14:useLocalDpi xmlns:a14="http://schemas.microsoft.com/office/drawing/2010/main" val="0"/>
-              </a:ext>
-            </a:extLst>
-          </a:blip>
-          <a:srcRect/>
-          <a:stretch>
-            <a:fillRect/>
-          </a:stretch>
-        </p:blipFill>
-        <p:spPr bwMode="auto">
-          <a:xfrm>
-            <a:off x="10751428" y="7349509"/>
-            <a:ext cx="2826513" cy="2067420"/>
-          </a:xfrm>
-          <a:prstGeom prst="rect">
-            <a:avLst/>
-          </a:prstGeom>
-          <a:noFill/>
-          <a:ln>
-            <a:noFill/>
-          </a:ln>
-          <a:effectLst/>
-          <a:extLst>
-            <a:ext uri="{909E8E84-426E-40DD-AFC4-6F175D3DCCD1}">
-              <a14:hiddenFill xmlns:a14="http://schemas.microsoft.com/office/drawing/2010/main">
-                <a:solidFill>
-                  <a:schemeClr val="accent1"/>
-                </a:solidFill>
-              </a14:hiddenFill>
-            </a:ext>
-            <a:ext uri="{91240B29-F687-4F45-9708-019B960494DF}">
-              <a14:hiddenLine xmlns:a14="http://schemas.microsoft.com/office/drawing/2010/main" w="9525">
-                <a:solidFill>
-                  <a:schemeClr val="tx1"/>
-                </a:solidFill>
-                <a:miter lim="800000"/>
-                <a:headEnd/>
-                <a:tailEnd/>
-              </a14:hiddenLine>
-            </a:ext>
-            <a:ext uri="{AF507438-7753-43E0-B8FC-AC1667EBCBE1}">
-              <a14:hiddenEffects xmlns:a14="http://schemas.microsoft.com/office/drawing/2010/main">
-                <a:effectLst>
-                  <a:outerShdw dist="35921" dir="2700000" algn="ctr" rotWithShape="0">
-                    <a:schemeClr val="bg2"/>
-                  </a:outerShdw>
-                </a:effectLst>
-              </a14:hiddenEffects>
-            </a:ext>
-          </a:extLst>
-        </p:spPr>
-      </p:pic>
       <p:sp>
         <p:nvSpPr>
           <p:cNvPr id="107" name="円/楕円 106"/>
@@ -49624,70 +49432,6 @@
           </a:p>
         </p:txBody>
       </p:sp>
-      <p:pic>
-        <p:nvPicPr>
-          <p:cNvPr id="113" name="Picture 4"/>
-          <p:cNvPicPr>
-            <a:picLocks noChangeAspect="1" noChangeArrowheads="1"/>
-          </p:cNvPicPr>
-          <p:nvPr/>
-        </p:nvPicPr>
-        <p:blipFill>
-          <a:blip r:embed="rId9">
-            <a:extLst>
-              <a:ext uri="{28A0092B-C50C-407E-A947-70E740481C1C}">
-                <a14:useLocalDpi xmlns:a14="http://schemas.microsoft.com/office/drawing/2010/main" val="0"/>
-              </a:ext>
-            </a:extLst>
-          </a:blip>
-          <a:srcRect/>
-          <a:stretch>
-            <a:fillRect/>
-          </a:stretch>
-        </p:blipFill>
-        <p:spPr bwMode="auto">
-          <a:xfrm>
-            <a:off x="10464527" y="3288432"/>
-            <a:ext cx="2894432" cy="2353814"/>
-          </a:xfrm>
-          <a:prstGeom prst="rect">
-            <a:avLst/>
-          </a:prstGeom>
-          <a:noFill/>
-          <a:ln>
-            <a:noFill/>
-          </a:ln>
-          <a:effectLst/>
-          <a:extLst>
-            <a:ext uri="{909E8E84-426E-40DD-AFC4-6F175D3DCCD1}">
-              <a14:hiddenFill xmlns:a14="http://schemas.microsoft.com/office/drawing/2010/main">
-                <a:solidFill>
-                  <a:schemeClr val="accent1"/>
-                </a:solidFill>
-              </a14:hiddenFill>
-            </a:ext>
-            <a:ext uri="{91240B29-F687-4F45-9708-019B960494DF}">
-              <a14:hiddenLine xmlns:a14="http://schemas.microsoft.com/office/drawing/2010/main" w="9525">
-                <a:solidFill>
-                  <a:schemeClr val="tx1"/>
-                </a:solidFill>
-                <a:miter lim="800000"/>
-                <a:headEnd/>
-                <a:tailEnd/>
-              </a14:hiddenLine>
-            </a:ext>
-            <a:ext uri="{AF507438-7753-43E0-B8FC-AC1667EBCBE1}">
-              <a14:hiddenEffects xmlns:a14="http://schemas.microsoft.com/office/drawing/2010/main">
-                <a:effectLst>
-                  <a:outerShdw dist="35921" dir="2700000" algn="ctr" rotWithShape="0">
-                    <a:schemeClr val="bg2"/>
-                  </a:outerShdw>
-                </a:effectLst>
-              </a14:hiddenEffects>
-            </a:ext>
-          </a:extLst>
-        </p:spPr>
-      </p:pic>
       <p:sp>
         <p:nvSpPr>
           <p:cNvPr id="114" name="円/楕円 113"/>
@@ -49885,7 +49629,7 @@
             <p:nvPr/>
           </p:nvPicPr>
           <p:blipFill rotWithShape="1">
-            <a:blip r:embed="rId10">
+            <a:blip r:embed="rId6">
               <a:extLst>
                 <a:ext uri="{28A0092B-C50C-407E-A947-70E740481C1C}">
                   <a14:useLocalDpi xmlns:a14="http://schemas.microsoft.com/office/drawing/2010/main" val="0"/>
@@ -49939,6 +49683,262 @@
           </p:spPr>
         </p:pic>
       </p:grpSp>
+      <p:pic>
+        <p:nvPicPr>
+          <p:cNvPr id="113" name="Picture 4"/>
+          <p:cNvPicPr>
+            <a:picLocks noChangeAspect="1" noChangeArrowheads="1"/>
+          </p:cNvPicPr>
+          <p:nvPr/>
+        </p:nvPicPr>
+        <p:blipFill>
+          <a:blip r:embed="rId7">
+            <a:extLst>
+              <a:ext uri="{28A0092B-C50C-407E-A947-70E740481C1C}">
+                <a14:useLocalDpi xmlns:a14="http://schemas.microsoft.com/office/drawing/2010/main" val="0"/>
+              </a:ext>
+            </a:extLst>
+          </a:blip>
+          <a:srcRect/>
+          <a:stretch>
+            <a:fillRect/>
+          </a:stretch>
+        </p:blipFill>
+        <p:spPr bwMode="auto">
+          <a:xfrm>
+            <a:off x="10464527" y="3288432"/>
+            <a:ext cx="2894432" cy="2353814"/>
+          </a:xfrm>
+          <a:prstGeom prst="rect">
+            <a:avLst/>
+          </a:prstGeom>
+          <a:noFill/>
+          <a:ln>
+            <a:noFill/>
+          </a:ln>
+          <a:effectLst/>
+          <a:extLst>
+            <a:ext uri="{909E8E84-426E-40DD-AFC4-6F175D3DCCD1}">
+              <a14:hiddenFill xmlns:a14="http://schemas.microsoft.com/office/drawing/2010/main">
+                <a:solidFill>
+                  <a:schemeClr val="accent1"/>
+                </a:solidFill>
+              </a14:hiddenFill>
+            </a:ext>
+            <a:ext uri="{91240B29-F687-4F45-9708-019B960494DF}">
+              <a14:hiddenLine xmlns:a14="http://schemas.microsoft.com/office/drawing/2010/main" w="9525">
+                <a:solidFill>
+                  <a:schemeClr val="tx1"/>
+                </a:solidFill>
+                <a:miter lim="800000"/>
+                <a:headEnd/>
+                <a:tailEnd/>
+              </a14:hiddenLine>
+            </a:ext>
+            <a:ext uri="{AF507438-7753-43E0-B8FC-AC1667EBCBE1}">
+              <a14:hiddenEffects xmlns:a14="http://schemas.microsoft.com/office/drawing/2010/main">
+                <a:effectLst>
+                  <a:outerShdw dist="35921" dir="2700000" algn="ctr" rotWithShape="0">
+                    <a:schemeClr val="bg2"/>
+                  </a:outerShdw>
+                </a:effectLst>
+              </a14:hiddenEffects>
+            </a:ext>
+          </a:extLst>
+        </p:spPr>
+      </p:pic>
+      <p:pic>
+        <p:nvPicPr>
+          <p:cNvPr id="106" name="Picture 2"/>
+          <p:cNvPicPr>
+            <a:picLocks noChangeAspect="1" noChangeArrowheads="1"/>
+          </p:cNvPicPr>
+          <p:nvPr/>
+        </p:nvPicPr>
+        <p:blipFill>
+          <a:blip r:embed="rId8">
+            <a:extLst>
+              <a:ext uri="{28A0092B-C50C-407E-A947-70E740481C1C}">
+                <a14:useLocalDpi xmlns:a14="http://schemas.microsoft.com/office/drawing/2010/main" val="0"/>
+              </a:ext>
+            </a:extLst>
+          </a:blip>
+          <a:srcRect/>
+          <a:stretch>
+            <a:fillRect/>
+          </a:stretch>
+        </p:blipFill>
+        <p:spPr bwMode="auto">
+          <a:xfrm>
+            <a:off x="10751428" y="7349509"/>
+            <a:ext cx="2826513" cy="2067420"/>
+          </a:xfrm>
+          <a:prstGeom prst="rect">
+            <a:avLst/>
+          </a:prstGeom>
+          <a:noFill/>
+          <a:ln>
+            <a:noFill/>
+          </a:ln>
+          <a:effectLst/>
+          <a:extLst>
+            <a:ext uri="{909E8E84-426E-40DD-AFC4-6F175D3DCCD1}">
+              <a14:hiddenFill xmlns:a14="http://schemas.microsoft.com/office/drawing/2010/main">
+                <a:solidFill>
+                  <a:schemeClr val="accent1"/>
+                </a:solidFill>
+              </a14:hiddenFill>
+            </a:ext>
+            <a:ext uri="{91240B29-F687-4F45-9708-019B960494DF}">
+              <a14:hiddenLine xmlns:a14="http://schemas.microsoft.com/office/drawing/2010/main" w="9525">
+                <a:solidFill>
+                  <a:schemeClr val="tx1"/>
+                </a:solidFill>
+                <a:miter lim="800000"/>
+                <a:headEnd/>
+                <a:tailEnd/>
+              </a14:hiddenLine>
+            </a:ext>
+            <a:ext uri="{AF507438-7753-43E0-B8FC-AC1667EBCBE1}">
+              <a14:hiddenEffects xmlns:a14="http://schemas.microsoft.com/office/drawing/2010/main">
+                <a:effectLst>
+                  <a:outerShdw dist="35921" dir="2700000" algn="ctr" rotWithShape="0">
+                    <a:schemeClr val="bg2"/>
+                  </a:outerShdw>
+                </a:effectLst>
+              </a14:hiddenEffects>
+            </a:ext>
+          </a:extLst>
+        </p:spPr>
+      </p:pic>
+      <p:pic>
+        <p:nvPicPr>
+          <p:cNvPr id="103" name="Picture 6"/>
+          <p:cNvPicPr>
+            <a:picLocks noChangeAspect="1" noChangeArrowheads="1"/>
+          </p:cNvPicPr>
+          <p:nvPr/>
+        </p:nvPicPr>
+        <p:blipFill>
+          <a:blip r:embed="rId9">
+            <a:extLst>
+              <a:ext uri="{28A0092B-C50C-407E-A947-70E740481C1C}">
+                <a14:useLocalDpi xmlns:a14="http://schemas.microsoft.com/office/drawing/2010/main" val="0"/>
+              </a:ext>
+            </a:extLst>
+          </a:blip>
+          <a:srcRect/>
+          <a:stretch>
+            <a:fillRect/>
+          </a:stretch>
+        </p:blipFill>
+        <p:spPr bwMode="auto">
+          <a:xfrm>
+            <a:off x="4559871" y="7076919"/>
+            <a:ext cx="3307397" cy="2476209"/>
+          </a:xfrm>
+          <a:prstGeom prst="rect">
+            <a:avLst/>
+          </a:prstGeom>
+          <a:noFill/>
+          <a:ln>
+            <a:noFill/>
+          </a:ln>
+          <a:effectLst/>
+          <a:extLst>
+            <a:ext uri="{909E8E84-426E-40DD-AFC4-6F175D3DCCD1}">
+              <a14:hiddenFill xmlns:a14="http://schemas.microsoft.com/office/drawing/2010/main">
+                <a:solidFill>
+                  <a:schemeClr val="accent1"/>
+                </a:solidFill>
+              </a14:hiddenFill>
+            </a:ext>
+            <a:ext uri="{91240B29-F687-4F45-9708-019B960494DF}">
+              <a14:hiddenLine xmlns:a14="http://schemas.microsoft.com/office/drawing/2010/main" w="9525">
+                <a:solidFill>
+                  <a:schemeClr val="tx1"/>
+                </a:solidFill>
+                <a:miter lim="800000"/>
+                <a:headEnd/>
+                <a:tailEnd/>
+              </a14:hiddenLine>
+            </a:ext>
+            <a:ext uri="{AF507438-7753-43E0-B8FC-AC1667EBCBE1}">
+              <a14:hiddenEffects xmlns:a14="http://schemas.microsoft.com/office/drawing/2010/main">
+                <a:effectLst>
+                  <a:outerShdw dist="35921" dir="2700000" algn="ctr" rotWithShape="0">
+                    <a:schemeClr val="bg2"/>
+                  </a:outerShdw>
+                </a:effectLst>
+              </a14:hiddenEffects>
+            </a:ext>
+          </a:extLst>
+        </p:spPr>
+      </p:pic>
+      <p:pic>
+        <p:nvPicPr>
+          <p:cNvPr id="95" name="Picture 5"/>
+          <p:cNvPicPr>
+            <a:picLocks noChangeAspect="1" noChangeArrowheads="1"/>
+          </p:cNvPicPr>
+          <p:nvPr/>
+        </p:nvPicPr>
+        <p:blipFill>
+          <a:blip r:embed="rId10">
+            <a:extLst>
+              <a:ext uri="{28A0092B-C50C-407E-A947-70E740481C1C}">
+                <a14:useLocalDpi xmlns:a14="http://schemas.microsoft.com/office/drawing/2010/main" val="0"/>
+              </a:ext>
+            </a:extLst>
+          </a:blip>
+          <a:srcRect/>
+          <a:stretch>
+            <a:fillRect/>
+          </a:stretch>
+        </p:blipFill>
+        <p:spPr bwMode="auto">
+          <a:xfrm>
+            <a:off x="5063927" y="3114318"/>
+            <a:ext cx="2664296" cy="2594096"/>
+          </a:xfrm>
+          <a:prstGeom prst="rect">
+            <a:avLst/>
+          </a:prstGeom>
+          <a:noFill/>
+          <a:ln>
+            <a:noFill/>
+          </a:ln>
+          <a:effectLst/>
+          <a:extLst>
+            <a:ext uri="{909E8E84-426E-40DD-AFC4-6F175D3DCCD1}">
+              <a14:hiddenFill xmlns:a14="http://schemas.microsoft.com/office/drawing/2010/main">
+                <a:solidFill>
+                  <a:schemeClr val="accent1"/>
+                </a:solidFill>
+              </a14:hiddenFill>
+            </a:ext>
+            <a:ext uri="{91240B29-F687-4F45-9708-019B960494DF}">
+              <a14:hiddenLine xmlns:a14="http://schemas.microsoft.com/office/drawing/2010/main" w="9525">
+                <a:solidFill>
+                  <a:schemeClr val="tx1"/>
+                </a:solidFill>
+                <a:miter lim="800000"/>
+                <a:headEnd/>
+                <a:tailEnd/>
+              </a14:hiddenLine>
+            </a:ext>
+            <a:ext uri="{AF507438-7753-43E0-B8FC-AC1667EBCBE1}">
+              <a14:hiddenEffects xmlns:a14="http://schemas.microsoft.com/office/drawing/2010/main">
+                <a:effectLst>
+                  <a:outerShdw dist="35921" dir="2700000" algn="ctr" rotWithShape="0">
+                    <a:schemeClr val="bg2"/>
+                  </a:outerShdw>
+                </a:effectLst>
+              </a14:hiddenEffects>
+            </a:ext>
+          </a:extLst>
+        </p:spPr>
+      </p:pic>
     </p:spTree>
     <p:extLst>
       <p:ext uri="{BB962C8B-B14F-4D97-AF65-F5344CB8AC3E}">

</xml_diff>

<commit_message>
model sheet little modified
</commit_message>
<xml_diff>
--- a/models/モデルシートv3.pptx
+++ b/models/モデルシートv3.pptx
@@ -27666,11 +27666,11 @@
           <c:showPercent val="0"/>
           <c:showBubbleSize val="0"/>
         </c:dLbls>
-        <c:axId val="177007616"/>
-        <c:axId val="177120000"/>
+        <c:axId val="106431616"/>
+        <c:axId val="106433344"/>
       </c:scatterChart>
       <c:valAx>
-        <c:axId val="177007616"/>
+        <c:axId val="106431616"/>
         <c:scaling>
           <c:orientation val="minMax"/>
         </c:scaling>
@@ -27680,12 +27680,12 @@
         <c:majorTickMark val="out"/>
         <c:minorTickMark val="none"/>
         <c:tickLblPos val="nextTo"/>
-        <c:crossAx val="177120000"/>
+        <c:crossAx val="106433344"/>
         <c:crosses val="autoZero"/>
         <c:crossBetween val="midCat"/>
       </c:valAx>
       <c:valAx>
-        <c:axId val="177120000"/>
+        <c:axId val="106433344"/>
         <c:scaling>
           <c:orientation val="minMax"/>
         </c:scaling>
@@ -27695,7 +27695,7 @@
         <c:majorTickMark val="out"/>
         <c:minorTickMark val="none"/>
         <c:tickLblPos val="nextTo"/>
-        <c:crossAx val="177007616"/>
+        <c:crossAx val="106431616"/>
         <c:crosses val="autoZero"/>
         <c:crossBetween val="midCat"/>
       </c:valAx>
@@ -27918,11 +27918,11 @@
         </c:dLbls>
         <c:marker val="1"/>
         <c:smooth val="0"/>
-        <c:axId val="197795840"/>
-        <c:axId val="197797376"/>
+        <c:axId val="125370880"/>
+        <c:axId val="106435648"/>
       </c:lineChart>
       <c:catAx>
-        <c:axId val="197795840"/>
+        <c:axId val="125370880"/>
         <c:scaling>
           <c:orientation val="minMax"/>
         </c:scaling>
@@ -27931,7 +27931,7 @@
         <c:majorTickMark val="out"/>
         <c:minorTickMark val="none"/>
         <c:tickLblPos val="nextTo"/>
-        <c:crossAx val="197797376"/>
+        <c:crossAx val="106435648"/>
         <c:crosses val="autoZero"/>
         <c:auto val="1"/>
         <c:lblAlgn val="ctr"/>
@@ -27939,7 +27939,7 @@
         <c:noMultiLvlLbl val="0"/>
       </c:catAx>
       <c:valAx>
-        <c:axId val="197797376"/>
+        <c:axId val="106435648"/>
         <c:scaling>
           <c:orientation val="minMax"/>
         </c:scaling>
@@ -27950,7 +27950,7 @@
         <c:majorTickMark val="out"/>
         <c:minorTickMark val="none"/>
         <c:tickLblPos val="nextTo"/>
-        <c:crossAx val="197795840"/>
+        <c:crossAx val="125370880"/>
         <c:crosses val="autoZero"/>
         <c:crossBetween val="between"/>
       </c:valAx>
@@ -33749,13 +33749,7 @@
               <a:rPr lang="ja-JP" altLang="en-US" sz="1200" dirty="0" smtClean="0">
                 <a:latin typeface="+mn-ea"/>
               </a:rPr>
-              <a:t>を用いてモデルを構成しました．要求図を用いて，大会における目標を実現するための要求を定義しました</a:t>
-            </a:r>
-            <a:r>
-              <a:rPr lang="ja-JP" altLang="en-US" sz="1200" dirty="0" smtClean="0">
-                <a:latin typeface="+mn-ea"/>
-              </a:rPr>
-              <a:t>．（</a:t>
+              <a:t>を用いてモデルを構成しました．要求図を用いて，大会における目標を実現するための要求を定義しました．（</a:t>
             </a:r>
             <a:r>
               <a:rPr lang="en-US" altLang="ja-JP" sz="1200" dirty="0">
@@ -34085,73 +34079,43 @@
               <a:rPr lang="ja-JP" altLang="en-US" sz="1200" dirty="0" smtClean="0">
                 <a:latin typeface="+mn-ea"/>
               </a:rPr>
-              <a:t>コース</a:t>
+              <a:t>コースを「区間」の集合と定義し，それぞれの区間</a:t>
+            </a:r>
+            <a:r>
+              <a:rPr lang="ja-JP" altLang="en-US" sz="1200" dirty="0">
+                <a:latin typeface="+mn-ea"/>
+              </a:rPr>
+              <a:t>に</a:t>
             </a:r>
             <a:r>
               <a:rPr lang="ja-JP" altLang="en-US" sz="1200" dirty="0" smtClean="0">
                 <a:latin typeface="+mn-ea"/>
               </a:rPr>
-              <a:t>を「</a:t>
+              <a:t>応じた走行パラメータと区間切替条件を</a:t>
+            </a:r>
+            <a:r>
+              <a:rPr lang="ja-JP" altLang="en-US" sz="1200" dirty="0">
+                <a:latin typeface="+mn-ea"/>
+              </a:rPr>
+              <a:t>設計</a:t>
             </a:r>
             <a:r>
               <a:rPr lang="ja-JP" altLang="en-US" sz="1200" dirty="0" smtClean="0">
                 <a:latin typeface="+mn-ea"/>
               </a:rPr>
-              <a:t>区間」の集合と定義し，それぞれの区間</a:t>
+              <a:t>すれば完走できることをコンセプトにモデルを</a:t>
             </a:r>
             <a:r>
               <a:rPr lang="ja-JP" altLang="en-US" sz="1200" dirty="0">
                 <a:latin typeface="+mn-ea"/>
               </a:rPr>
-              <a:t>に</a:t>
+              <a:t>構成</a:t>
             </a:r>
             <a:r>
               <a:rPr lang="ja-JP" altLang="en-US" sz="1200" dirty="0" smtClean="0">
                 <a:latin typeface="+mn-ea"/>
               </a:rPr>
-              <a:t>応じた走行パラメータと区間切替条件を</a:t>
-            </a:r>
-            <a:r>
-              <a:rPr lang="ja-JP" altLang="en-US" sz="1200" dirty="0">
-                <a:latin typeface="+mn-ea"/>
-              </a:rPr>
-              <a:t>設計</a:t>
-            </a:r>
-            <a:r>
-              <a:rPr lang="ja-JP" altLang="en-US" sz="1200" dirty="0" smtClean="0">
-                <a:latin typeface="+mn-ea"/>
-              </a:rPr>
-              <a:t>すれば完走</a:t>
-            </a:r>
-            <a:r>
-              <a:rPr lang="ja-JP" altLang="en-US" sz="1200" dirty="0" smtClean="0">
-                <a:latin typeface="+mn-ea"/>
-              </a:rPr>
-              <a:t>できることをコンセプトにモデル</a:t>
-            </a:r>
-            <a:r>
-              <a:rPr lang="ja-JP" altLang="en-US" sz="1200" dirty="0" smtClean="0">
-                <a:latin typeface="+mn-ea"/>
-              </a:rPr>
-              <a:t>を</a:t>
-            </a:r>
-            <a:r>
-              <a:rPr lang="ja-JP" altLang="en-US" sz="1200" dirty="0">
-                <a:latin typeface="+mn-ea"/>
-              </a:rPr>
-              <a:t>構成</a:t>
-            </a:r>
-            <a:r>
-              <a:rPr lang="ja-JP" altLang="en-US" sz="1200" dirty="0" smtClean="0">
-                <a:latin typeface="+mn-ea"/>
-              </a:rPr>
-              <a:t>しました．要素の責務</a:t>
-            </a:r>
-            <a:r>
-              <a:rPr lang="ja-JP" altLang="en-US" sz="1200" dirty="0" smtClean="0">
-                <a:latin typeface="+mn-ea"/>
-              </a:rPr>
-              <a:t>が明確に別れた単方向・疎結合な構造にご注目ください．</a:t>
+              <a:t>しました．要素の責務が明確に別れた単方向・疎結合な構造にご注目ください．</a:t>
             </a:r>
             <a:r>
               <a:rPr lang="en-US" altLang="ja-JP" sz="1200" dirty="0" smtClean="0">
@@ -34336,21 +34300,7 @@
                 <a:latin typeface="+mn-ea"/>
                 <a:cs typeface="メイリオ" pitchFamily="50" charset="-128"/>
               </a:rPr>
-              <a:t>などにかかせないモータ駆動です．一方で，区間切替はより長い周期でも十分に動作要件を満たすと考えました．</a:t>
-            </a:r>
-            <a:r>
-              <a:rPr lang="ja-JP" altLang="en-US" sz="1200" dirty="0" smtClean="0">
-                <a:latin typeface="+mn-ea"/>
-                <a:cs typeface="メイリオ" pitchFamily="50" charset="-128"/>
-              </a:rPr>
-              <a:t>（詳細</a:t>
-            </a:r>
-            <a:r>
-              <a:rPr lang="ja-JP" altLang="en-US" sz="1200" dirty="0" smtClean="0">
-                <a:latin typeface="+mn-ea"/>
-                <a:cs typeface="メイリオ" pitchFamily="50" charset="-128"/>
-              </a:rPr>
-              <a:t>は</a:t>
+              <a:t>などにかかせないモータ駆動です．一方で，区間切替はより長い周期でも十分に動作要件を満たすと考えました．（詳細は</a:t>
             </a:r>
             <a:r>
               <a:rPr lang="en-US" altLang="ja-JP" sz="1200" dirty="0">
@@ -34716,13 +34666,7 @@
               <a:rPr lang="ja-JP" altLang="en-US" sz="1600" dirty="0" smtClean="0">
                 <a:latin typeface="+mn-ea"/>
               </a:rPr>
-              <a:t>た良いこんぶです</a:t>
-            </a:r>
-            <a:r>
-              <a:rPr lang="ja-JP" altLang="en-US" sz="1600" dirty="0" smtClean="0">
-                <a:latin typeface="+mn-ea"/>
-              </a:rPr>
-              <a:t>！</a:t>
+              <a:t>た良いこんぶです！</a:t>
             </a:r>
             <a:endParaRPr lang="en-US" altLang="ja-JP" sz="1600" dirty="0" smtClean="0">
               <a:latin typeface="+mn-ea"/>
@@ -35079,14 +35023,7 @@
                 <a:latin typeface="あくあフォント" pitchFamily="1" charset="-128"/>
                 <a:ea typeface="あくあフォント" pitchFamily="1" charset="-128"/>
               </a:rPr>
-              <a:t>頭の栄養！いいこんぶ</a:t>
-            </a:r>
-            <a:r>
-              <a:rPr lang="ja-JP" altLang="en-US" sz="2000" dirty="0" smtClean="0">
-                <a:latin typeface="あくあフォント" pitchFamily="1" charset="-128"/>
-                <a:ea typeface="あくあフォント" pitchFamily="1" charset="-128"/>
-              </a:rPr>
-              <a:t>！</a:t>
+              <a:t>頭の栄養！いいこんぶ！</a:t>
             </a:r>
             <a:endParaRPr lang="en-US" altLang="ja-JP" sz="1600" dirty="0" smtClean="0">
               <a:latin typeface="あくあフォント" pitchFamily="1" charset="-128"/>
@@ -46549,7 +46486,7 @@
       </p:grpSpPr>
       <p:pic>
         <p:nvPicPr>
-          <p:cNvPr id="110" name="図 109"/>
+          <p:cNvPr id="6" name="図 5"/>
           <p:cNvPicPr>
             <a:picLocks noChangeAspect="1"/>
           </p:cNvPicPr>
@@ -46569,8 +46506,8 @@
         </p:blipFill>
         <p:spPr>
           <a:xfrm>
-            <a:off x="8236039" y="2784376"/>
-            <a:ext cx="2826648" cy="823446"/>
+            <a:off x="672330" y="6534221"/>
+            <a:ext cx="3677294" cy="1016265"/>
           </a:xfrm>
           <a:prstGeom prst="rect">
             <a:avLst/>
@@ -46579,7 +46516,7 @@
       </p:pic>
       <p:pic>
         <p:nvPicPr>
-          <p:cNvPr id="105" name="図 104"/>
+          <p:cNvPr id="4" name="図 3"/>
           <p:cNvPicPr>
             <a:picLocks noChangeAspect="1"/>
           </p:cNvPicPr>
@@ -46599,8 +46536,8 @@
         </p:blipFill>
         <p:spPr>
           <a:xfrm>
-            <a:off x="8356370" y="6694040"/>
-            <a:ext cx="2396189" cy="920656"/>
+            <a:off x="8191397" y="6688149"/>
+            <a:ext cx="2639809" cy="1014258"/>
           </a:xfrm>
           <a:prstGeom prst="rect">
             <a:avLst/>
@@ -46609,7 +46546,7 @@
       </p:pic>
       <p:pic>
         <p:nvPicPr>
-          <p:cNvPr id="100" name="図 99"/>
+          <p:cNvPr id="110" name="図 109"/>
           <p:cNvPicPr>
             <a:picLocks noChangeAspect="1"/>
           </p:cNvPicPr>
@@ -46629,8 +46566,8 @@
         </p:blipFill>
         <p:spPr>
           <a:xfrm>
-            <a:off x="743447" y="6494939"/>
-            <a:ext cx="3509733" cy="969957"/>
+            <a:off x="8236039" y="2640360"/>
+            <a:ext cx="2778824" cy="809514"/>
           </a:xfrm>
           <a:prstGeom prst="rect">
             <a:avLst/>
@@ -47756,13 +47693,13 @@
         </p:nvSpPr>
         <p:spPr>
           <a:xfrm>
-            <a:off x="10464527" y="2089303"/>
+            <a:off x="10464527" y="2064296"/>
             <a:ext cx="2231023" cy="427232"/>
           </a:xfrm>
           <a:prstGeom prst="wedgeRoundRectCallout">
             <a:avLst>
-              <a:gd name="adj1" fmla="val -36710"/>
-              <a:gd name="adj2" fmla="val 170197"/>
+              <a:gd name="adj1" fmla="val -35429"/>
+              <a:gd name="adj2" fmla="val 138984"/>
               <a:gd name="adj3" fmla="val 16667"/>
             </a:avLst>
           </a:prstGeom>
@@ -47833,13 +47770,13 @@
         </p:nvSpPr>
         <p:spPr>
           <a:xfrm>
-            <a:off x="11413589" y="2627582"/>
+            <a:off x="11413589" y="2522807"/>
             <a:ext cx="2075275" cy="582035"/>
           </a:xfrm>
           <a:prstGeom prst="wedgeRoundRectCallout">
             <a:avLst>
-              <a:gd name="adj1" fmla="val -77112"/>
-              <a:gd name="adj2" fmla="val 104599"/>
+              <a:gd name="adj1" fmla="val -80050"/>
+              <a:gd name="adj2" fmla="val 91507"/>
               <a:gd name="adj3" fmla="val 16667"/>
             </a:avLst>
           </a:prstGeom>
@@ -48064,256 +48001,6 @@
       </p:sp>
       <p:sp>
         <p:nvSpPr>
-          <p:cNvPr id="74" name="角丸四角形吹き出し 73"/>
-          <p:cNvSpPr/>
-          <p:nvPr/>
-        </p:nvSpPr>
-        <p:spPr>
-          <a:xfrm>
-            <a:off x="11014863" y="6494939"/>
-            <a:ext cx="2401993" cy="783091"/>
-          </a:xfrm>
-          <a:prstGeom prst="wedgeRoundRectCallout">
-            <a:avLst>
-              <a:gd name="adj1" fmla="val -94013"/>
-              <a:gd name="adj2" fmla="val 69303"/>
-              <a:gd name="adj3" fmla="val 16667"/>
-            </a:avLst>
-          </a:prstGeom>
-          <a:ln w="12700">
-            <a:solidFill>
-              <a:srgbClr val="C3AF3C"/>
-            </a:solidFill>
-          </a:ln>
-        </p:spPr>
-        <p:style>
-          <a:lnRef idx="2">
-            <a:schemeClr val="accent6"/>
-          </a:lnRef>
-          <a:fillRef idx="1">
-            <a:schemeClr val="lt1"/>
-          </a:fillRef>
-          <a:effectRef idx="0">
-            <a:schemeClr val="accent6"/>
-          </a:effectRef>
-          <a:fontRef idx="minor">
-            <a:schemeClr val="dk1"/>
-          </a:fontRef>
-        </p:style>
-        <p:txBody>
-          <a:bodyPr lIns="36000" tIns="36000" rIns="36000" bIns="36000" rtlCol="0" anchor="ctr"/>
-          <a:lstStyle/>
-          <a:p>
-            <a:r>
-              <a:rPr lang="ja-JP" altLang="en-US" sz="1000" dirty="0" smtClean="0">
-                <a:latin typeface="+mn-ea"/>
-              </a:rPr>
-              <a:t>・</a:t>
-            </a:r>
-            <a:r>
-              <a:rPr lang="ja-JP" altLang="en-US" sz="1050" u="sng" dirty="0" smtClean="0">
-                <a:latin typeface="+mn-ea"/>
-              </a:rPr>
-              <a:t>目標尻尾角度への制御失敗</a:t>
-            </a:r>
-            <a:endParaRPr lang="en-US" altLang="ja-JP" sz="1050" u="sng" dirty="0" smtClean="0">
-              <a:latin typeface="+mn-ea"/>
-            </a:endParaRPr>
-          </a:p>
-          <a:p>
-            <a:r>
-              <a:rPr lang="ja-JP" altLang="en-US" sz="1000" dirty="0" smtClean="0">
-                <a:solidFill>
-                  <a:srgbClr val="FF0000"/>
-                </a:solidFill>
-                <a:latin typeface="+mn-ea"/>
-              </a:rPr>
-              <a:t>走行体仰角制御</a:t>
-            </a:r>
-            <a:r>
-              <a:rPr lang="ja-JP" altLang="en-US" sz="1000" dirty="0" smtClean="0">
-                <a:latin typeface="+mn-ea"/>
-              </a:rPr>
-              <a:t>（</a:t>
-            </a:r>
-            <a:r>
-              <a:rPr lang="en-US" altLang="ja-JP" sz="1000" dirty="0">
-                <a:latin typeface="+mn-ea"/>
-              </a:rPr>
-              <a:t>p</a:t>
-            </a:r>
-            <a:r>
-              <a:rPr lang="en-US" altLang="ja-JP" sz="1000" dirty="0" smtClean="0">
-                <a:latin typeface="+mn-ea"/>
-              </a:rPr>
-              <a:t>. </a:t>
-            </a:r>
-            <a:r>
-              <a:rPr lang="en-US" altLang="ja-JP" sz="1000" dirty="0">
-                <a:latin typeface="+mn-ea"/>
-              </a:rPr>
-              <a:t>5</a:t>
-            </a:r>
-            <a:r>
-              <a:rPr lang="en-US" altLang="ja-JP" sz="1000" dirty="0" smtClean="0">
-                <a:latin typeface="+mn-ea"/>
-              </a:rPr>
-              <a:t> </a:t>
-            </a:r>
-            <a:r>
-              <a:rPr lang="ja-JP" altLang="en-US" sz="1000" dirty="0" smtClean="0">
-                <a:latin typeface="+mn-ea"/>
-              </a:rPr>
-              <a:t>要素技術参照）によって，安定した尻尾角度制御を実現．</a:t>
-            </a:r>
-            <a:endParaRPr lang="en-US" altLang="ja-JP" sz="900" dirty="0" smtClean="0">
-              <a:latin typeface="+mn-ea"/>
-            </a:endParaRPr>
-          </a:p>
-        </p:txBody>
-      </p:sp>
-      <p:sp>
-        <p:nvSpPr>
-          <p:cNvPr id="73" name="角丸四角形吹き出し 72"/>
-          <p:cNvSpPr/>
-          <p:nvPr/>
-        </p:nvSpPr>
-        <p:spPr>
-          <a:xfrm>
-            <a:off x="8325623" y="7896944"/>
-            <a:ext cx="2138904" cy="1368152"/>
-          </a:xfrm>
-          <a:prstGeom prst="wedgeRoundRectCallout">
-            <a:avLst>
-              <a:gd name="adj1" fmla="val -28110"/>
-              <a:gd name="adj2" fmla="val -69522"/>
-              <a:gd name="adj3" fmla="val 16667"/>
-            </a:avLst>
-          </a:prstGeom>
-          <a:ln w="12700">
-            <a:solidFill>
-              <a:schemeClr val="tx1"/>
-            </a:solidFill>
-          </a:ln>
-        </p:spPr>
-        <p:style>
-          <a:lnRef idx="2">
-            <a:schemeClr val="accent6"/>
-          </a:lnRef>
-          <a:fillRef idx="1">
-            <a:schemeClr val="lt1"/>
-          </a:fillRef>
-          <a:effectRef idx="0">
-            <a:schemeClr val="accent6"/>
-          </a:effectRef>
-          <a:fontRef idx="minor">
-            <a:schemeClr val="dk1"/>
-          </a:fontRef>
-        </p:style>
-        <p:txBody>
-          <a:bodyPr lIns="36000" tIns="36000" rIns="36000" bIns="36000" rtlCol="0" anchor="ctr"/>
-          <a:lstStyle/>
-          <a:p>
-            <a:r>
-              <a:rPr lang="ja-JP" altLang="en-US" sz="1000" dirty="0">
-                <a:latin typeface="+mn-ea"/>
-              </a:rPr>
-              <a:t>・</a:t>
-            </a:r>
-            <a:r>
-              <a:rPr lang="ja-JP" altLang="en-US" sz="1050" u="sng" dirty="0">
-                <a:latin typeface="+mn-ea"/>
-              </a:rPr>
-              <a:t>ゲート検知の失敗</a:t>
-            </a:r>
-          </a:p>
-          <a:p>
-            <a:r>
-              <a:rPr lang="ja-JP" altLang="en-US" sz="1000" dirty="0" smtClean="0">
-                <a:latin typeface="+mn-ea"/>
-              </a:rPr>
-              <a:t>ゲート検知に</a:t>
-            </a:r>
-            <a:r>
-              <a:rPr lang="ja-JP" altLang="en-US" sz="1000" dirty="0">
-                <a:latin typeface="+mn-ea"/>
-              </a:rPr>
-              <a:t>用いる</a:t>
-            </a:r>
-            <a:r>
-              <a:rPr lang="ja-JP" altLang="en-US" sz="1000" dirty="0" smtClean="0">
-                <a:latin typeface="+mn-ea"/>
-              </a:rPr>
-              <a:t>超音波センサの</a:t>
-            </a:r>
-            <a:r>
-              <a:rPr lang="en-US" altLang="ja-JP" sz="1000" dirty="0" smtClean="0">
-                <a:latin typeface="+mn-ea"/>
-              </a:rPr>
-              <a:t>API</a:t>
-            </a:r>
-            <a:r>
-              <a:rPr lang="ja-JP" altLang="en-US" sz="1000" dirty="0">
-                <a:latin typeface="+mn-ea"/>
-              </a:rPr>
-              <a:t>は</a:t>
-            </a:r>
-            <a:r>
-              <a:rPr lang="ja-JP" altLang="en-US" sz="1000" dirty="0" smtClean="0">
-                <a:latin typeface="+mn-ea"/>
-              </a:rPr>
-              <a:t>仕様上</a:t>
-            </a:r>
-            <a:r>
-              <a:rPr lang="en-US" altLang="ja-JP" sz="1000" dirty="0" smtClean="0">
-                <a:latin typeface="+mn-ea"/>
-              </a:rPr>
-              <a:t>50ms</a:t>
-            </a:r>
-            <a:r>
-              <a:rPr lang="ja-JP" altLang="en-US" sz="1000" dirty="0">
-                <a:latin typeface="+mn-ea"/>
-              </a:rPr>
-              <a:t>周期</a:t>
-            </a:r>
-            <a:r>
-              <a:rPr lang="ja-JP" altLang="en-US" sz="1000" dirty="0" smtClean="0">
-                <a:latin typeface="+mn-ea"/>
-              </a:rPr>
-              <a:t>で使用しなければならない． </a:t>
-            </a:r>
-            <a:r>
-              <a:rPr lang="ja-JP" altLang="en-US" sz="1000" dirty="0">
-                <a:latin typeface="+mn-ea"/>
-              </a:rPr>
-              <a:t>よって</a:t>
-            </a:r>
-            <a:r>
-              <a:rPr lang="ja-JP" altLang="en-US" sz="1000" dirty="0" smtClean="0">
-                <a:latin typeface="+mn-ea"/>
-              </a:rPr>
-              <a:t>ゲートに接近する際の速度が</a:t>
-            </a:r>
-            <a:r>
-              <a:rPr lang="ja-JP" altLang="en-US" sz="1000" dirty="0">
-                <a:latin typeface="+mn-ea"/>
-              </a:rPr>
-              <a:t>速すぎる</a:t>
-            </a:r>
-            <a:r>
-              <a:rPr lang="ja-JP" altLang="en-US" sz="1000" dirty="0" smtClean="0">
-                <a:latin typeface="+mn-ea"/>
-              </a:rPr>
-              <a:t>と検知が出来ないためゲート接近前に減速することで精度の高い検知を実現．</a:t>
-            </a:r>
-            <a:endParaRPr lang="ja-JP" altLang="en-US" sz="1000" dirty="0">
-              <a:latin typeface="+mn-ea"/>
-            </a:endParaRPr>
-          </a:p>
-        </p:txBody>
-      </p:sp>
-      <p:sp>
-        <p:nvSpPr>
           <p:cNvPr id="47" name="角丸四角形吹き出し 46"/>
           <p:cNvSpPr/>
           <p:nvPr/>
@@ -48321,7 +48008,7 @@
         <p:spPr>
           <a:xfrm>
             <a:off x="4271839" y="2204120"/>
-            <a:ext cx="3683415" cy="933698"/>
+            <a:ext cx="3683415" cy="853430"/>
           </a:xfrm>
           <a:prstGeom prst="wedgeRoundRectCallout">
             <a:avLst>
@@ -48447,7 +48134,7 @@
         </p:nvSpPr>
         <p:spPr>
           <a:xfrm>
-            <a:off x="2396518" y="7479269"/>
+            <a:off x="2396518" y="7623285"/>
             <a:ext cx="1629865" cy="1929843"/>
           </a:xfrm>
           <a:prstGeom prst="wedgeRoundRectCallout">
@@ -48600,7 +48287,7 @@
         </p:nvSpPr>
         <p:spPr>
           <a:xfrm>
-            <a:off x="813597" y="7464896"/>
+            <a:off x="813597" y="7608912"/>
             <a:ext cx="1442019" cy="1918991"/>
           </a:xfrm>
           <a:prstGeom prst="wedgeRoundRectCallout">
@@ -48612,7 +48299,7 @@
           </a:prstGeom>
           <a:ln w="12700">
             <a:solidFill>
-              <a:srgbClr val="FFC000"/>
+              <a:srgbClr val="FF6600"/>
             </a:solidFill>
           </a:ln>
         </p:spPr>
@@ -48840,8 +48527,8 @@
         </p:nvSpPr>
         <p:spPr>
           <a:xfrm>
-            <a:off x="5282601" y="3607823"/>
-            <a:ext cx="1067266" cy="386226"/>
+            <a:off x="5482233" y="3571374"/>
+            <a:ext cx="1014234" cy="378465"/>
           </a:xfrm>
           <a:prstGeom prst="ellipse">
             <a:avLst/>
@@ -48890,8 +48577,8 @@
         </p:nvSpPr>
         <p:spPr>
           <a:xfrm>
-            <a:off x="6639595" y="4135973"/>
-            <a:ext cx="944612" cy="335716"/>
+            <a:off x="6890544" y="4102954"/>
+            <a:ext cx="855712" cy="353970"/>
           </a:xfrm>
           <a:prstGeom prst="ellipse">
             <a:avLst/>
@@ -48940,8 +48627,8 @@
         </p:nvSpPr>
         <p:spPr>
           <a:xfrm>
-            <a:off x="6717953" y="4574034"/>
-            <a:ext cx="800596" cy="320300"/>
+            <a:off x="6901551" y="4527808"/>
+            <a:ext cx="835180" cy="360037"/>
           </a:xfrm>
           <a:prstGeom prst="ellipse">
             <a:avLst/>
@@ -48990,8 +48677,8 @@
         </p:nvSpPr>
         <p:spPr>
           <a:xfrm>
-            <a:off x="5277565" y="5156830"/>
-            <a:ext cx="1067266" cy="451100"/>
+            <a:off x="6639888" y="3134008"/>
+            <a:ext cx="1347792" cy="404859"/>
           </a:xfrm>
           <a:prstGeom prst="ellipse">
             <a:avLst/>
@@ -49140,8 +48827,8 @@
         </p:nvSpPr>
         <p:spPr>
           <a:xfrm>
-            <a:off x="5800994" y="8769585"/>
-            <a:ext cx="901719" cy="374355"/>
+            <a:off x="5820044" y="8784825"/>
+            <a:ext cx="901719" cy="351495"/>
           </a:xfrm>
           <a:prstGeom prst="ellipse">
             <a:avLst/>
@@ -49190,20 +48877,20 @@
         </p:nvSpPr>
         <p:spPr>
           <a:xfrm>
-            <a:off x="12041083" y="7326649"/>
-            <a:ext cx="1368152" cy="691451"/>
+            <a:off x="11688663" y="7274220"/>
+            <a:ext cx="1656184" cy="662293"/>
           </a:xfrm>
           <a:prstGeom prst="ellipse">
             <a:avLst/>
           </a:prstGeom>
           <a:solidFill>
-            <a:srgbClr val="C3AF3C">
+            <a:srgbClr val="FFC000">
               <a:alpha val="25490"/>
             </a:srgbClr>
           </a:solidFill>
           <a:ln w="3175">
             <a:solidFill>
-              <a:srgbClr val="C3AF3C">
+              <a:srgbClr val="FFC000">
                 <a:alpha val="40784"/>
               </a:srgbClr>
             </a:solidFill>
@@ -49240,72 +48927,26 @@
         </p:nvSpPr>
         <p:spPr>
           <a:xfrm>
-            <a:off x="10716279" y="7902766"/>
+            <a:off x="10339561" y="7842081"/>
             <a:ext cx="1210704" cy="480453"/>
           </a:xfrm>
           <a:prstGeom prst="ellipse">
             <a:avLst/>
           </a:prstGeom>
           <a:solidFill>
-            <a:schemeClr val="tx1">
+            <a:schemeClr val="accent2">
+              <a:lumMod val="40000"/>
+              <a:lumOff val="60000"/>
               <a:alpha val="25490"/>
             </a:schemeClr>
           </a:solidFill>
           <a:ln w="3175">
             <a:solidFill>
-              <a:schemeClr val="tx1">
+              <a:schemeClr val="accent2">
+                <a:lumMod val="40000"/>
+                <a:lumOff val="60000"/>
                 <a:alpha val="40784"/>
               </a:schemeClr>
-            </a:solidFill>
-          </a:ln>
-        </p:spPr>
-        <p:style>
-          <a:lnRef idx="2">
-            <a:schemeClr val="accent2"/>
-          </a:lnRef>
-          <a:fillRef idx="1">
-            <a:schemeClr val="lt1"/>
-          </a:fillRef>
-          <a:effectRef idx="0">
-            <a:schemeClr val="accent2"/>
-          </a:effectRef>
-          <a:fontRef idx="minor">
-            <a:schemeClr val="dk1"/>
-          </a:fontRef>
-        </p:style>
-        <p:txBody>
-          <a:bodyPr rtlCol="0" anchor="ctr"/>
-          <a:lstStyle/>
-          <a:p>
-            <a:pPr algn="ctr"/>
-            <a:endParaRPr kumimoji="1" lang="ja-JP" altLang="en-US"/>
-          </a:p>
-        </p:txBody>
-      </p:sp>
-      <p:sp>
-        <p:nvSpPr>
-          <p:cNvPr id="109" name="円/楕円 108"/>
-          <p:cNvSpPr/>
-          <p:nvPr/>
-        </p:nvSpPr>
-        <p:spPr>
-          <a:xfrm>
-            <a:off x="12048703" y="8401000"/>
-            <a:ext cx="1368152" cy="691451"/>
-          </a:xfrm>
-          <a:prstGeom prst="ellipse">
-            <a:avLst/>
-          </a:prstGeom>
-          <a:solidFill>
-            <a:srgbClr val="C3AF3C">
-              <a:alpha val="25490"/>
-            </a:srgbClr>
-          </a:solidFill>
-          <a:ln w="3175">
-            <a:solidFill>
-              <a:srgbClr val="C3AF3C">
-                <a:alpha val="40784"/>
-              </a:srgbClr>
             </a:solidFill>
           </a:ln>
         </p:spPr>
@@ -49340,8 +48981,8 @@
         </p:nvSpPr>
         <p:spPr>
           <a:xfrm>
-            <a:off x="11769848" y="3318912"/>
-            <a:ext cx="1647007" cy="544552"/>
+            <a:off x="10999623" y="5177402"/>
+            <a:ext cx="1200996" cy="410394"/>
           </a:xfrm>
           <a:prstGeom prst="ellipse">
             <a:avLst/>
@@ -49390,8 +49031,8 @@
         </p:nvSpPr>
         <p:spPr>
           <a:xfrm>
-            <a:off x="11769849" y="4255017"/>
-            <a:ext cx="1647006" cy="547338"/>
+            <a:off x="12466466" y="3942796"/>
+            <a:ext cx="1003730" cy="380173"/>
           </a:xfrm>
           <a:prstGeom prst="ellipse">
             <a:avLst/>
@@ -49440,8 +49081,8 @@
         </p:nvSpPr>
         <p:spPr>
           <a:xfrm>
-            <a:off x="10464527" y="4125813"/>
-            <a:ext cx="1305322" cy="564679"/>
+            <a:off x="10922695" y="3774306"/>
+            <a:ext cx="1305322" cy="498222"/>
           </a:xfrm>
           <a:prstGeom prst="ellipse">
             <a:avLst/>
@@ -49490,8 +49131,8 @@
         </p:nvSpPr>
         <p:spPr>
           <a:xfrm>
-            <a:off x="12154217" y="4734184"/>
-            <a:ext cx="887740" cy="483224"/>
+            <a:off x="12483611" y="4360395"/>
+            <a:ext cx="996501" cy="369720"/>
           </a:xfrm>
           <a:prstGeom prst="ellipse">
             <a:avLst/>
@@ -49683,9 +49324,312 @@
           </p:spPr>
         </p:pic>
       </p:grpSp>
+      <p:sp>
+        <p:nvSpPr>
+          <p:cNvPr id="74" name="角丸四角形吹き出し 73"/>
+          <p:cNvSpPr/>
+          <p:nvPr/>
+        </p:nvSpPr>
+        <p:spPr>
+          <a:xfrm>
+            <a:off x="10896575" y="6494939"/>
+            <a:ext cx="2490272" cy="700339"/>
+          </a:xfrm>
+          <a:prstGeom prst="wedgeRoundRectCallout">
+            <a:avLst>
+              <a:gd name="adj1" fmla="val -86533"/>
+              <a:gd name="adj2" fmla="val 49960"/>
+              <a:gd name="adj3" fmla="val 16667"/>
+            </a:avLst>
+          </a:prstGeom>
+          <a:ln w="12700">
+            <a:solidFill>
+              <a:srgbClr val="FFC000"/>
+            </a:solidFill>
+          </a:ln>
+        </p:spPr>
+        <p:style>
+          <a:lnRef idx="2">
+            <a:schemeClr val="accent6"/>
+          </a:lnRef>
+          <a:fillRef idx="1">
+            <a:schemeClr val="lt1"/>
+          </a:fillRef>
+          <a:effectRef idx="0">
+            <a:schemeClr val="accent6"/>
+          </a:effectRef>
+          <a:fontRef idx="minor">
+            <a:schemeClr val="dk1"/>
+          </a:fontRef>
+        </p:style>
+        <p:txBody>
+          <a:bodyPr lIns="36000" tIns="36000" rIns="36000" bIns="36000" rtlCol="0" anchor="ctr"/>
+          <a:lstStyle/>
+          <a:p>
+            <a:r>
+              <a:rPr lang="ja-JP" altLang="en-US" sz="1000" dirty="0" smtClean="0">
+                <a:latin typeface="+mn-ea"/>
+              </a:rPr>
+              <a:t>・</a:t>
+            </a:r>
+            <a:r>
+              <a:rPr lang="ja-JP" altLang="en-US" sz="1050" u="sng" dirty="0" smtClean="0">
+                <a:latin typeface="+mn-ea"/>
+              </a:rPr>
+              <a:t>目標尻尾角度への制御失敗</a:t>
+            </a:r>
+            <a:endParaRPr lang="en-US" altLang="ja-JP" sz="1050" u="sng" dirty="0" smtClean="0">
+              <a:latin typeface="+mn-ea"/>
+            </a:endParaRPr>
+          </a:p>
+          <a:p>
+            <a:r>
+              <a:rPr lang="ja-JP" altLang="en-US" sz="1000" dirty="0" smtClean="0">
+                <a:solidFill>
+                  <a:srgbClr val="FF0000"/>
+                </a:solidFill>
+                <a:latin typeface="+mn-ea"/>
+              </a:rPr>
+              <a:t>走行体仰角制御</a:t>
+            </a:r>
+            <a:r>
+              <a:rPr lang="ja-JP" altLang="en-US" sz="1000" dirty="0" smtClean="0">
+                <a:latin typeface="+mn-ea"/>
+              </a:rPr>
+              <a:t>（</a:t>
+            </a:r>
+            <a:r>
+              <a:rPr lang="en-US" altLang="ja-JP" sz="1000" dirty="0">
+                <a:latin typeface="+mn-ea"/>
+              </a:rPr>
+              <a:t>p</a:t>
+            </a:r>
+            <a:r>
+              <a:rPr lang="en-US" altLang="ja-JP" sz="1000" dirty="0" smtClean="0">
+                <a:latin typeface="+mn-ea"/>
+              </a:rPr>
+              <a:t>. </a:t>
+            </a:r>
+            <a:r>
+              <a:rPr lang="en-US" altLang="ja-JP" sz="1000" dirty="0">
+                <a:latin typeface="+mn-ea"/>
+              </a:rPr>
+              <a:t>5</a:t>
+            </a:r>
+            <a:r>
+              <a:rPr lang="en-US" altLang="ja-JP" sz="1000" dirty="0" smtClean="0">
+                <a:latin typeface="+mn-ea"/>
+              </a:rPr>
+              <a:t> </a:t>
+            </a:r>
+            <a:r>
+              <a:rPr lang="ja-JP" altLang="en-US" sz="1000" dirty="0" smtClean="0">
+                <a:latin typeface="+mn-ea"/>
+              </a:rPr>
+              <a:t>要素技術参照）によって，安定した尻尾角度制御を実現．</a:t>
+            </a:r>
+            <a:endParaRPr lang="en-US" altLang="ja-JP" sz="900" dirty="0" smtClean="0">
+              <a:latin typeface="+mn-ea"/>
+            </a:endParaRPr>
+          </a:p>
+        </p:txBody>
+      </p:sp>
+      <p:sp>
+        <p:nvSpPr>
+          <p:cNvPr id="60" name="円/楕円 59"/>
+          <p:cNvSpPr/>
+          <p:nvPr/>
+        </p:nvSpPr>
+        <p:spPr>
+          <a:xfrm>
+            <a:off x="11688663" y="8474027"/>
+            <a:ext cx="1656184" cy="662293"/>
+          </a:xfrm>
+          <a:prstGeom prst="ellipse">
+            <a:avLst/>
+          </a:prstGeom>
+          <a:solidFill>
+            <a:srgbClr val="FFC000">
+              <a:alpha val="25490"/>
+            </a:srgbClr>
+          </a:solidFill>
+          <a:ln w="3175">
+            <a:solidFill>
+              <a:srgbClr val="FFC000">
+                <a:alpha val="40784"/>
+              </a:srgbClr>
+            </a:solidFill>
+          </a:ln>
+        </p:spPr>
+        <p:style>
+          <a:lnRef idx="2">
+            <a:schemeClr val="accent2"/>
+          </a:lnRef>
+          <a:fillRef idx="1">
+            <a:schemeClr val="lt1"/>
+          </a:fillRef>
+          <a:effectRef idx="0">
+            <a:schemeClr val="accent2"/>
+          </a:effectRef>
+          <a:fontRef idx="minor">
+            <a:schemeClr val="dk1"/>
+          </a:fontRef>
+        </p:style>
+        <p:txBody>
+          <a:bodyPr rtlCol="0" anchor="ctr"/>
+          <a:lstStyle/>
+          <a:p>
+            <a:pPr algn="ctr"/>
+            <a:endParaRPr kumimoji="1" lang="ja-JP" altLang="en-US"/>
+          </a:p>
+        </p:txBody>
+      </p:sp>
+      <p:sp>
+        <p:nvSpPr>
+          <p:cNvPr id="73" name="角丸四角形吹き出し 72"/>
+          <p:cNvSpPr/>
+          <p:nvPr/>
+        </p:nvSpPr>
+        <p:spPr>
+          <a:xfrm>
+            <a:off x="8160271" y="7896944"/>
+            <a:ext cx="2138904" cy="1368152"/>
+          </a:xfrm>
+          <a:prstGeom prst="wedgeRoundRectCallout">
+            <a:avLst>
+              <a:gd name="adj1" fmla="val -14305"/>
+              <a:gd name="adj2" fmla="val -107813"/>
+              <a:gd name="adj3" fmla="val 16667"/>
+            </a:avLst>
+          </a:prstGeom>
+          <a:ln w="12700">
+            <a:solidFill>
+              <a:schemeClr val="accent2">
+                <a:lumMod val="40000"/>
+                <a:lumOff val="60000"/>
+              </a:schemeClr>
+            </a:solidFill>
+          </a:ln>
+        </p:spPr>
+        <p:style>
+          <a:lnRef idx="2">
+            <a:schemeClr val="accent6"/>
+          </a:lnRef>
+          <a:fillRef idx="1">
+            <a:schemeClr val="lt1"/>
+          </a:fillRef>
+          <a:effectRef idx="0">
+            <a:schemeClr val="accent6"/>
+          </a:effectRef>
+          <a:fontRef idx="minor">
+            <a:schemeClr val="dk1"/>
+          </a:fontRef>
+        </p:style>
+        <p:txBody>
+          <a:bodyPr lIns="36000" tIns="36000" rIns="36000" bIns="36000" rtlCol="0" anchor="ctr"/>
+          <a:lstStyle/>
+          <a:p>
+            <a:r>
+              <a:rPr lang="ja-JP" altLang="en-US" sz="1000" dirty="0">
+                <a:latin typeface="+mn-ea"/>
+              </a:rPr>
+              <a:t>・</a:t>
+            </a:r>
+            <a:r>
+              <a:rPr lang="ja-JP" altLang="en-US" sz="1050" u="sng" dirty="0">
+                <a:latin typeface="+mn-ea"/>
+              </a:rPr>
+              <a:t>ゲート検知の失敗</a:t>
+            </a:r>
+          </a:p>
+          <a:p>
+            <a:r>
+              <a:rPr lang="ja-JP" altLang="en-US" sz="1000" dirty="0" smtClean="0">
+                <a:latin typeface="+mn-ea"/>
+              </a:rPr>
+              <a:t>ゲート検知に</a:t>
+            </a:r>
+            <a:r>
+              <a:rPr lang="ja-JP" altLang="en-US" sz="1000" dirty="0">
+                <a:latin typeface="+mn-ea"/>
+              </a:rPr>
+              <a:t>用いる</a:t>
+            </a:r>
+            <a:r>
+              <a:rPr lang="ja-JP" altLang="en-US" sz="1000" dirty="0" smtClean="0">
+                <a:latin typeface="+mn-ea"/>
+              </a:rPr>
+              <a:t>超音波センサの</a:t>
+            </a:r>
+            <a:r>
+              <a:rPr lang="en-US" altLang="ja-JP" sz="1000" dirty="0" smtClean="0">
+                <a:latin typeface="+mn-ea"/>
+              </a:rPr>
+              <a:t>API</a:t>
+            </a:r>
+            <a:r>
+              <a:rPr lang="ja-JP" altLang="en-US" sz="1000" dirty="0">
+                <a:latin typeface="+mn-ea"/>
+              </a:rPr>
+              <a:t>は</a:t>
+            </a:r>
+            <a:r>
+              <a:rPr lang="ja-JP" altLang="en-US" sz="1000" dirty="0" smtClean="0">
+                <a:latin typeface="+mn-ea"/>
+              </a:rPr>
+              <a:t>仕様上</a:t>
+            </a:r>
+            <a:r>
+              <a:rPr lang="en-US" altLang="ja-JP" sz="1000" dirty="0" smtClean="0">
+                <a:latin typeface="+mn-ea"/>
+              </a:rPr>
+              <a:t>50ms</a:t>
+            </a:r>
+            <a:r>
+              <a:rPr lang="ja-JP" altLang="en-US" sz="1000" dirty="0">
+                <a:latin typeface="+mn-ea"/>
+              </a:rPr>
+              <a:t>周期</a:t>
+            </a:r>
+            <a:r>
+              <a:rPr lang="ja-JP" altLang="en-US" sz="1000" dirty="0" smtClean="0">
+                <a:latin typeface="+mn-ea"/>
+              </a:rPr>
+              <a:t>で使用しなければならない． </a:t>
+            </a:r>
+            <a:r>
+              <a:rPr lang="ja-JP" altLang="en-US" sz="1000" dirty="0">
+                <a:latin typeface="+mn-ea"/>
+              </a:rPr>
+              <a:t>よって</a:t>
+            </a:r>
+            <a:r>
+              <a:rPr lang="ja-JP" altLang="en-US" sz="1000" dirty="0" smtClean="0">
+                <a:latin typeface="+mn-ea"/>
+              </a:rPr>
+              <a:t>ゲートに接近する際の速度が</a:t>
+            </a:r>
+            <a:r>
+              <a:rPr lang="ja-JP" altLang="en-US" sz="1000" dirty="0">
+                <a:latin typeface="+mn-ea"/>
+              </a:rPr>
+              <a:t>速すぎる</a:t>
+            </a:r>
+            <a:r>
+              <a:rPr lang="ja-JP" altLang="en-US" sz="1000" dirty="0" smtClean="0">
+                <a:latin typeface="+mn-ea"/>
+              </a:rPr>
+              <a:t>と検知が出来ないためゲート接近前に減速することで精度の高い検知を実現．</a:t>
+            </a:r>
+            <a:endParaRPr lang="ja-JP" altLang="en-US" sz="1000" dirty="0">
+              <a:latin typeface="+mn-ea"/>
+            </a:endParaRPr>
+          </a:p>
+        </p:txBody>
+      </p:sp>
       <p:pic>
         <p:nvPicPr>
-          <p:cNvPr id="113" name="Picture 4"/>
+          <p:cNvPr id="1027" name="Picture 3"/>
           <p:cNvPicPr>
             <a:picLocks noChangeAspect="1" noChangeArrowheads="1"/>
           </p:cNvPicPr>
@@ -49706,8 +49650,8 @@
         </p:blipFill>
         <p:spPr bwMode="auto">
           <a:xfrm>
-            <a:off x="10464527" y="3288432"/>
-            <a:ext cx="2894432" cy="2353814"/>
+            <a:off x="4444430" y="7057232"/>
+            <a:ext cx="3455414" cy="2515393"/>
           </a:xfrm>
           <a:prstGeom prst="rect">
             <a:avLst/>
@@ -49749,7 +49693,7 @@
       </p:pic>
       <p:pic>
         <p:nvPicPr>
-          <p:cNvPr id="106" name="Picture 2"/>
+          <p:cNvPr id="1028" name="Picture 4"/>
           <p:cNvPicPr>
             <a:picLocks noChangeAspect="1" noChangeArrowheads="1"/>
           </p:cNvPicPr>
@@ -49770,8 +49714,8 @@
         </p:blipFill>
         <p:spPr bwMode="auto">
           <a:xfrm>
-            <a:off x="10751428" y="7349509"/>
-            <a:ext cx="2826513" cy="2067420"/>
+            <a:off x="5221183" y="3042310"/>
+            <a:ext cx="2724546" cy="2652758"/>
           </a:xfrm>
           <a:prstGeom prst="rect">
             <a:avLst/>
@@ -49813,7 +49757,7 @@
       </p:pic>
       <p:pic>
         <p:nvPicPr>
-          <p:cNvPr id="103" name="Picture 6"/>
+          <p:cNvPr id="1032" name="Picture 8"/>
           <p:cNvPicPr>
             <a:picLocks noChangeAspect="1" noChangeArrowheads="1"/>
           </p:cNvPicPr>
@@ -49834,8 +49778,8 @@
         </p:blipFill>
         <p:spPr bwMode="auto">
           <a:xfrm>
-            <a:off x="4559871" y="7076919"/>
-            <a:ext cx="3307397" cy="2476209"/>
+            <a:off x="10896575" y="3265572"/>
+            <a:ext cx="2711646" cy="2322224"/>
           </a:xfrm>
           <a:prstGeom prst="rect">
             <a:avLst/>
@@ -49877,7 +49821,7 @@
       </p:pic>
       <p:pic>
         <p:nvPicPr>
-          <p:cNvPr id="95" name="Picture 5"/>
+          <p:cNvPr id="1033" name="Picture 9"/>
           <p:cNvPicPr>
             <a:picLocks noChangeAspect="1" noChangeArrowheads="1"/>
           </p:cNvPicPr>
@@ -49898,8 +49842,8 @@
         </p:blipFill>
         <p:spPr bwMode="auto">
           <a:xfrm>
-            <a:off x="5063927" y="3114318"/>
-            <a:ext cx="2664296" cy="2594096"/>
+            <a:off x="10320511" y="7246912"/>
+            <a:ext cx="3184624" cy="2306216"/>
           </a:xfrm>
           <a:prstGeom prst="rect">
             <a:avLst/>

</xml_diff>